<commit_message>
small change in presentation, add presentation-link to readme
</commit_message>
<xml_diff>
--- a/presentation/presentation.pptx
+++ b/presentation/presentation.pptx
@@ -208,7 +208,7 @@
           <a:p>
             <a:fld id="{89219E45-9071-5D4A-8911-E7A523ADC39E}" type="datetimeFigureOut">
               <a:rPr lang="en-US" smtClean="0"/>
-              <a:t>7/4/15</a:t>
+              <a:t>7/6/15</a:t>
             </a:fld>
             <a:endParaRPr lang="en-US"/>
           </a:p>
@@ -1195,7 +1195,7 @@
           <a:p>
             <a:fld id="{0408543B-E886-7644-849C-D7DD9FE17ADD}" type="datetimeFigureOut">
               <a:rPr lang="en-US" smtClean="0"/>
-              <a:t>7/4/15</a:t>
+              <a:t>7/6/15</a:t>
             </a:fld>
             <a:endParaRPr lang="en-US"/>
           </a:p>
@@ -1365,7 +1365,7 @@
           <a:p>
             <a:fld id="{0408543B-E886-7644-849C-D7DD9FE17ADD}" type="datetimeFigureOut">
               <a:rPr lang="en-US" smtClean="0"/>
-              <a:t>7/4/15</a:t>
+              <a:t>7/6/15</a:t>
             </a:fld>
             <a:endParaRPr lang="en-US"/>
           </a:p>
@@ -1545,7 +1545,7 @@
           <a:p>
             <a:fld id="{0408543B-E886-7644-849C-D7DD9FE17ADD}" type="datetimeFigureOut">
               <a:rPr lang="en-US" smtClean="0"/>
-              <a:t>7/4/15</a:t>
+              <a:t>7/6/15</a:t>
             </a:fld>
             <a:endParaRPr lang="en-US"/>
           </a:p>
@@ -1715,7 +1715,7 @@
           <a:p>
             <a:fld id="{0408543B-E886-7644-849C-D7DD9FE17ADD}" type="datetimeFigureOut">
               <a:rPr lang="en-US" smtClean="0"/>
-              <a:t>7/4/15</a:t>
+              <a:t>7/6/15</a:t>
             </a:fld>
             <a:endParaRPr lang="en-US"/>
           </a:p>
@@ -1961,7 +1961,7 @@
           <a:p>
             <a:fld id="{0408543B-E886-7644-849C-D7DD9FE17ADD}" type="datetimeFigureOut">
               <a:rPr lang="en-US" smtClean="0"/>
-              <a:t>7/4/15</a:t>
+              <a:t>7/6/15</a:t>
             </a:fld>
             <a:endParaRPr lang="en-US"/>
           </a:p>
@@ -2193,7 +2193,7 @@
           <a:p>
             <a:fld id="{0408543B-E886-7644-849C-D7DD9FE17ADD}" type="datetimeFigureOut">
               <a:rPr lang="en-US" smtClean="0"/>
-              <a:t>7/4/15</a:t>
+              <a:t>7/6/15</a:t>
             </a:fld>
             <a:endParaRPr lang="en-US"/>
           </a:p>
@@ -2560,7 +2560,7 @@
           <a:p>
             <a:fld id="{0408543B-E886-7644-849C-D7DD9FE17ADD}" type="datetimeFigureOut">
               <a:rPr lang="en-US" smtClean="0"/>
-              <a:t>7/4/15</a:t>
+              <a:t>7/6/15</a:t>
             </a:fld>
             <a:endParaRPr lang="en-US"/>
           </a:p>
@@ -2678,7 +2678,7 @@
           <a:p>
             <a:fld id="{0408543B-E886-7644-849C-D7DD9FE17ADD}" type="datetimeFigureOut">
               <a:rPr lang="en-US" smtClean="0"/>
-              <a:t>7/4/15</a:t>
+              <a:t>7/6/15</a:t>
             </a:fld>
             <a:endParaRPr lang="en-US"/>
           </a:p>
@@ -2773,7 +2773,7 @@
           <a:p>
             <a:fld id="{0408543B-E886-7644-849C-D7DD9FE17ADD}" type="datetimeFigureOut">
               <a:rPr lang="en-US" smtClean="0"/>
-              <a:t>7/4/15</a:t>
+              <a:t>7/6/15</a:t>
             </a:fld>
             <a:endParaRPr lang="en-US"/>
           </a:p>
@@ -3050,7 +3050,7 @@
           <a:p>
             <a:fld id="{0408543B-E886-7644-849C-D7DD9FE17ADD}" type="datetimeFigureOut">
               <a:rPr lang="en-US" smtClean="0"/>
-              <a:t>7/4/15</a:t>
+              <a:t>7/6/15</a:t>
             </a:fld>
             <a:endParaRPr lang="en-US"/>
           </a:p>
@@ -3303,7 +3303,7 @@
           <a:p>
             <a:fld id="{0408543B-E886-7644-849C-D7DD9FE17ADD}" type="datetimeFigureOut">
               <a:rPr lang="en-US" smtClean="0"/>
-              <a:t>7/4/15</a:t>
+              <a:t>7/6/15</a:t>
             </a:fld>
             <a:endParaRPr lang="en-US"/>
           </a:p>
@@ -3516,7 +3516,7 @@
           <a:p>
             <a:fld id="{0408543B-E886-7644-849C-D7DD9FE17ADD}" type="datetimeFigureOut">
               <a:rPr lang="en-US" smtClean="0"/>
-              <a:t>7/4/15</a:t>
+              <a:t>7/6/15</a:t>
             </a:fld>
             <a:endParaRPr lang="en-US"/>
           </a:p>
@@ -6022,7 +6022,6 @@
               <a:rPr lang="en-US" sz="2000" dirty="0"/>
               <a:t>ice-cream combinations</a:t>
             </a:r>
-            <a:endParaRPr lang="en-US" sz="2000" dirty="0"/>
           </a:p>
           <a:p>
             <a:pPr marL="342900" indent="-342900">
@@ -6080,7 +6079,7 @@
           <a:p>
             <a:r>
               <a:rPr lang="en-US" sz="2000" dirty="0"/>
-              <a:t>Yes, definitely! Brute-force hits a computational limit pretty fast.</a:t>
+              <a:t>Yes, please! Brute force hits a computational limit pretty fast.</a:t>
             </a:r>
           </a:p>
         </p:txBody>
@@ -6853,8 +6852,8 @@
         </p:nvSpPr>
         <p:spPr>
           <a:xfrm>
-            <a:off x="2084682" y="1166843"/>
-            <a:ext cx="8022637" cy="4524315"/>
+            <a:off x="2084682" y="797511"/>
+            <a:ext cx="8022637" cy="5262979"/>
           </a:xfrm>
           <a:prstGeom prst="rect">
             <a:avLst/>
@@ -6869,11 +6868,25 @@
           <a:p>
             <a:r>
               <a:rPr lang="en-US" sz="2400" dirty="0"/>
-              <a:t>Experiment I made out of curiosity in my KaosPilot (alternative school in Denmark) team to solve a task mathematically that would otherwise likely be a long-winded and possibly heated social process: </a:t>
-            </a:r>
+              <a:t>Experiment I made out of curiosity in my KaosPilot </a:t>
+            </a:r>
+            <a:r>
+              <a:rPr lang="en-US" dirty="0"/>
+              <a:t>(alternative school in Denmark) </a:t>
+            </a:r>
+            <a:r>
+              <a:rPr lang="en-US" sz="2400" dirty="0"/>
+              <a:t>team to solve a task mathematically that would otherwise likely be a long-winded and possibly heated social process: </a:t>
+            </a:r>
+          </a:p>
+          <a:p>
             <a:r>
               <a:rPr lang="en-US" sz="2400" b="1" dirty="0"/>
-              <a:t>split whole group into little teams that work together on a project</a:t>
+              <a:t>to </a:t>
+            </a:r>
+            <a:r>
+              <a:rPr lang="en-US" sz="2400" b="1" dirty="0"/>
+              <a:t>split the whole group into smaller teams that work together on a project</a:t>
             </a:r>
             <a:r>
               <a:rPr lang="en-US" sz="2400" dirty="0"/>
@@ -6902,7 +6915,7 @@
             </a:r>
             <a:r>
               <a:rPr lang="en-US" sz="2400" dirty="0" smtClean="0"/>
-              <a:t> by the participants when being faced with the results. Not thought through to the end, so initial motivation not achieved.</a:t>
+              <a:t> by the participants when being faced with the results. Not thought through to the end, so initial motivation of mathematically forming the “perfect subgroups“ not achieved.</a:t>
             </a:r>
           </a:p>
           <a:p>
@@ -7043,7 +7056,7 @@
                                         <p:tgtEl>
                                           <p:spTgt spid="4">
                                             <p:txEl>
-                                              <p:pRg st="2" end="2"/>
+                                              <p:pRg st="1" end="1"/>
                                             </p:txEl>
                                           </p:spTgt>
                                         </p:tgtEl>
@@ -7061,7 +7074,7 @@
                                         <p:tgtEl>
                                           <p:spTgt spid="4">
                                             <p:txEl>
-                                              <p:pRg st="2" end="2"/>
+                                              <p:pRg st="1" end="1"/>
                                             </p:txEl>
                                           </p:spTgt>
                                         </p:tgtEl>
@@ -7104,7 +7117,7 @@
                                         <p:tgtEl>
                                           <p:spTgt spid="4">
                                             <p:txEl>
-                                              <p:pRg st="4" end="4"/>
+                                              <p:pRg st="3" end="3"/>
                                             </p:txEl>
                                           </p:spTgt>
                                         </p:tgtEl>
@@ -7122,7 +7135,68 @@
                                         <p:tgtEl>
                                           <p:spTgt spid="4">
                                             <p:txEl>
-                                              <p:pRg st="4" end="4"/>
+                                              <p:pRg st="3" end="3"/>
+                                            </p:txEl>
+                                          </p:spTgt>
+                                        </p:tgtEl>
+                                      </p:cBhvr>
+                                    </p:animEffect>
+                                  </p:childTnLst>
+                                </p:cTn>
+                              </p:par>
+                            </p:childTnLst>
+                          </p:cTn>
+                        </p:par>
+                      </p:childTnLst>
+                    </p:cTn>
+                  </p:par>
+                  <p:par>
+                    <p:cTn id="18" fill="hold">
+                      <p:stCondLst>
+                        <p:cond delay="indefinite"/>
+                      </p:stCondLst>
+                      <p:childTnLst>
+                        <p:par>
+                          <p:cTn id="19" fill="hold">
+                            <p:stCondLst>
+                              <p:cond delay="0"/>
+                            </p:stCondLst>
+                            <p:childTnLst>
+                              <p:par>
+                                <p:cTn id="20" presetID="10" presetClass="entr" presetSubtype="0" fill="hold" grpId="0" nodeType="clickEffect">
+                                  <p:stCondLst>
+                                    <p:cond delay="0"/>
+                                  </p:stCondLst>
+                                  <p:childTnLst>
+                                    <p:set>
+                                      <p:cBhvr>
+                                        <p:cTn id="21" dur="1" fill="hold">
+                                          <p:stCondLst>
+                                            <p:cond delay="0"/>
+                                          </p:stCondLst>
+                                        </p:cTn>
+                                        <p:tgtEl>
+                                          <p:spTgt spid="4">
+                                            <p:txEl>
+                                              <p:pRg st="5" end="5"/>
+                                            </p:txEl>
+                                          </p:spTgt>
+                                        </p:tgtEl>
+                                        <p:attrNameLst>
+                                          <p:attrName>style.visibility</p:attrName>
+                                        </p:attrNameLst>
+                                      </p:cBhvr>
+                                      <p:to>
+                                        <p:strVal val="visible"/>
+                                      </p:to>
+                                    </p:set>
+                                    <p:animEffect transition="in" filter="fade">
+                                      <p:cBhvr>
+                                        <p:cTn id="22" dur="500"/>
+                                        <p:tgtEl>
+                                          <p:spTgt spid="4">
+                                            <p:txEl>
+                                              <p:pRg st="5" end="5"/>
                                             </p:txEl>
                                           </p:spTgt>
                                         </p:tgtEl>
@@ -16853,8 +16927,8 @@
             </p:nvSpPr>
             <p:spPr>
               <a:xfrm>
-                <a:off x="2663649" y="297671"/>
-                <a:ext cx="7117433" cy="3046988"/>
+                <a:off x="2663649" y="352535"/>
+                <a:ext cx="7117433" cy="2923877"/>
               </a:xfrm>
               <a:prstGeom prst="rect">
                 <a:avLst/>
@@ -16875,7 +16949,7 @@
               </a:p>
               <a:p>
                 <a:pPr algn="ctr"/>
-                <a:endParaRPr lang="en-US" sz="2000" b="0" dirty="0" smtClean="0"/>
+                <a:endParaRPr lang="en-US" sz="1400" b="0" dirty="0" smtClean="0"/>
               </a:p>
               <a:p>
                 <a:pPr algn="ctr"/>
@@ -17027,8 +17101,8 @@
             </p:nvSpPr>
             <p:spPr>
               <a:xfrm>
-                <a:off x="2663649" y="297671"/>
-                <a:ext cx="7117433" cy="3046988"/>
+                <a:off x="2663649" y="352535"/>
+                <a:ext cx="7117433" cy="2923877"/>
               </a:xfrm>
               <a:prstGeom prst="rect">
                 <a:avLst/>
@@ -17036,7 +17110,7 @@
               <a:blipFill rotWithShape="0">
                 <a:blip r:embed="rId3"/>
                 <a:stretch>
-                  <a:fillRect t="-1200"/>
+                  <a:fillRect t="-1253" b="-835"/>
                 </a:stretch>
               </a:blipFill>
             </p:spPr>
@@ -22067,21 +22141,30 @@
                             </p:childTnLst>
                           </p:cTn>
                         </p:par>
+                      </p:childTnLst>
+                    </p:cTn>
+                  </p:par>
+                  <p:par>
+                    <p:cTn id="13" fill="hold">
+                      <p:stCondLst>
+                        <p:cond delay="indefinite"/>
+                      </p:stCondLst>
+                      <p:childTnLst>
                         <p:par>
-                          <p:cTn id="13" fill="hold">
+                          <p:cTn id="14" fill="hold">
                             <p:stCondLst>
-                              <p:cond delay="500"/>
+                              <p:cond delay="0"/>
                             </p:stCondLst>
                             <p:childTnLst>
                               <p:par>
-                                <p:cTn id="14" presetID="10" presetClass="entr" presetSubtype="0" fill="hold" grpId="0" nodeType="afterEffect">
+                                <p:cTn id="15" presetID="10" presetClass="entr" presetSubtype="0" fill="hold" grpId="0" nodeType="clickEffect">
                                   <p:stCondLst>
                                     <p:cond delay="0"/>
                                   </p:stCondLst>
                                   <p:childTnLst>
                                     <p:set>
                                       <p:cBhvr>
-                                        <p:cTn id="15" dur="1" fill="hold">
+                                        <p:cTn id="16" dur="1" fill="hold">
                                           <p:stCondLst>
                                             <p:cond delay="0"/>
                                           </p:stCondLst>
@@ -22103,7 +22186,7 @@
                                     </p:set>
                                     <p:animEffect transition="in" filter="fade">
                                       <p:cBhvr>
-                                        <p:cTn id="16" dur="500"/>
+                                        <p:cTn id="17" dur="500"/>
                                         <p:tgtEl>
                                           <p:spTgt spid="2">
                                             <p:txEl>
@@ -22721,11 +22804,6 @@
               </a:rPr>
               <a:t>information about topology of social landscape is in those subgroups: “social input” for the algorithm</a:t>
             </a:r>
-            <a:endParaRPr lang="en-US" sz="1400" dirty="0" err="1">
-              <a:solidFill>
-                <a:srgbClr val="FF0000"/>
-              </a:solidFill>
-            </a:endParaRPr>
           </a:p>
         </p:txBody>
       </p:sp>
@@ -24177,15 +24255,7 @@
                   <a:srgbClr val="FF0000"/>
                 </a:solidFill>
               </a:rPr>
-              <a:t>g</a:t>
-            </a:r>
-            <a:r>
-              <a:rPr lang="en-US" sz="1600" dirty="0" err="1">
-                <a:solidFill>
-                  <a:srgbClr val="FF0000"/>
-                </a:solidFill>
-              </a:rPr>
-              <a:t>enerate subsubgroups</a:t>
+              <a:t>generate subsubgroups</a:t>
             </a:r>
           </a:p>
         </p:txBody>
@@ -24220,11 +24290,6 @@
               </a:rPr>
               <a:t>count &amp; rank</a:t>
             </a:r>
-            <a:endParaRPr lang="en-US" sz="1600" dirty="0" err="1">
-              <a:solidFill>
-                <a:srgbClr val="FF0000"/>
-              </a:solidFill>
-            </a:endParaRPr>
           </a:p>
         </p:txBody>
       </p:sp>
@@ -24351,8 +24416,8 @@
           </a:fontRef>
         </p:style>
       </p:cxnSp>
-      <mc:AlternateContent xmlns:mc="http://schemas.openxmlformats.org/markup-compatibility/2006">
-        <mc:Choice xmlns:a14="http://schemas.microsoft.com/office/drawing/2010/main" Requires="a14">
+      <mc:AlternateContent xmlns:mc="http://schemas.openxmlformats.org/markup-compatibility/2006" xmlns:a14="http://schemas.microsoft.com/office/drawing/2010/main">
+        <mc:Choice Requires="a14">
           <p:sp>
             <p:nvSpPr>
               <p:cNvPr id="14" name="TextBox 13"/>
@@ -24375,6 +24440,7 @@
               </a:bodyPr>
               <a:lstStyle/>
               <a:p>
+                <a:pPr/>
                 <a14:m>
                   <m:oMathPara xmlns:m="http://schemas.openxmlformats.org/officeDocument/2006/math">
                     <m:oMathParaPr>
@@ -24450,7 +24516,7 @@
             </p:txBody>
           </p:sp>
         </mc:Choice>
-        <mc:Fallback>
+        <mc:Fallback xmlns="">
           <p:sp>
             <p:nvSpPr>
               <p:cNvPr id="14" name="TextBox 13"/>

</xml_diff>